<commit_message>
fix: Renaming to InTimeAD
Signed-off-by: LouisCarpentier42 <louis.carpentier@kuleuven.be>
</commit_message>
<xml_diff>
--- a/docs/logo/dtaianomaly-logo.pptx
+++ b/docs/logo/dtaianomaly-logo.pptx
@@ -6,10 +6,11 @@
   </p:sldMasterIdLst>
   <p:sldIdLst>
     <p:sldId id="256" r:id="rId2"/>
-    <p:sldId id="260" r:id="rId3"/>
-    <p:sldId id="258" r:id="rId4"/>
-    <p:sldId id="262" r:id="rId5"/>
-    <p:sldId id="261" r:id="rId6"/>
+    <p:sldId id="263" r:id="rId3"/>
+    <p:sldId id="260" r:id="rId4"/>
+    <p:sldId id="258" r:id="rId5"/>
+    <p:sldId id="262" r:id="rId6"/>
+    <p:sldId id="261" r:id="rId7"/>
   </p:sldIdLst>
   <p:sldSz cx="5400675" cy="5400675"/>
   <p:notesSz cx="6858000" cy="9144000"/>
@@ -761,7 +762,7 @@
           <a:p>
             <a:fld id="{08EBD9BC-8B18-4DA6-8AA8-A6CD51BCB149}" type="datetimeFigureOut">
               <a:rPr lang="en-US" smtClean="0"/>
-              <a:t>12/12/2024</a:t>
+              <a:t>9/8/2025</a:t>
             </a:fld>
             <a:endParaRPr lang="en-US"/>
           </a:p>
@@ -931,7 +932,7 @@
           <a:p>
             <a:fld id="{08EBD9BC-8B18-4DA6-8AA8-A6CD51BCB149}" type="datetimeFigureOut">
               <a:rPr lang="en-US" smtClean="0"/>
-              <a:t>12/12/2024</a:t>
+              <a:t>9/8/2025</a:t>
             </a:fld>
             <a:endParaRPr lang="en-US"/>
           </a:p>
@@ -1111,7 +1112,7 @@
           <a:p>
             <a:fld id="{08EBD9BC-8B18-4DA6-8AA8-A6CD51BCB149}" type="datetimeFigureOut">
               <a:rPr lang="en-US" smtClean="0"/>
-              <a:t>12/12/2024</a:t>
+              <a:t>9/8/2025</a:t>
             </a:fld>
             <a:endParaRPr lang="en-US"/>
           </a:p>
@@ -1281,7 +1282,7 @@
           <a:p>
             <a:fld id="{08EBD9BC-8B18-4DA6-8AA8-A6CD51BCB149}" type="datetimeFigureOut">
               <a:rPr lang="en-US" smtClean="0"/>
-              <a:t>12/12/2024</a:t>
+              <a:t>9/8/2025</a:t>
             </a:fld>
             <a:endParaRPr lang="en-US"/>
           </a:p>
@@ -1527,7 +1528,7 @@
           <a:p>
             <a:fld id="{08EBD9BC-8B18-4DA6-8AA8-A6CD51BCB149}" type="datetimeFigureOut">
               <a:rPr lang="en-US" smtClean="0"/>
-              <a:t>12/12/2024</a:t>
+              <a:t>9/8/2025</a:t>
             </a:fld>
             <a:endParaRPr lang="en-US"/>
           </a:p>
@@ -1759,7 +1760,7 @@
           <a:p>
             <a:fld id="{08EBD9BC-8B18-4DA6-8AA8-A6CD51BCB149}" type="datetimeFigureOut">
               <a:rPr lang="en-US" smtClean="0"/>
-              <a:t>12/12/2024</a:t>
+              <a:t>9/8/2025</a:t>
             </a:fld>
             <a:endParaRPr lang="en-US"/>
           </a:p>
@@ -2126,7 +2127,7 @@
           <a:p>
             <a:fld id="{08EBD9BC-8B18-4DA6-8AA8-A6CD51BCB149}" type="datetimeFigureOut">
               <a:rPr lang="en-US" smtClean="0"/>
-              <a:t>12/12/2024</a:t>
+              <a:t>9/8/2025</a:t>
             </a:fld>
             <a:endParaRPr lang="en-US"/>
           </a:p>
@@ -2244,7 +2245,7 @@
           <a:p>
             <a:fld id="{08EBD9BC-8B18-4DA6-8AA8-A6CD51BCB149}" type="datetimeFigureOut">
               <a:rPr lang="en-US" smtClean="0"/>
-              <a:t>12/12/2024</a:t>
+              <a:t>9/8/2025</a:t>
             </a:fld>
             <a:endParaRPr lang="en-US"/>
           </a:p>
@@ -2339,7 +2340,7 @@
           <a:p>
             <a:fld id="{08EBD9BC-8B18-4DA6-8AA8-A6CD51BCB149}" type="datetimeFigureOut">
               <a:rPr lang="en-US" smtClean="0"/>
-              <a:t>12/12/2024</a:t>
+              <a:t>9/8/2025</a:t>
             </a:fld>
             <a:endParaRPr lang="en-US"/>
           </a:p>
@@ -2616,7 +2617,7 @@
           <a:p>
             <a:fld id="{08EBD9BC-8B18-4DA6-8AA8-A6CD51BCB149}" type="datetimeFigureOut">
               <a:rPr lang="en-US" smtClean="0"/>
-              <a:t>12/12/2024</a:t>
+              <a:t>9/8/2025</a:t>
             </a:fld>
             <a:endParaRPr lang="en-US"/>
           </a:p>
@@ -2873,7 +2874,7 @@
           <a:p>
             <a:fld id="{08EBD9BC-8B18-4DA6-8AA8-A6CD51BCB149}" type="datetimeFigureOut">
               <a:rPr lang="en-US" smtClean="0"/>
-              <a:t>12/12/2024</a:t>
+              <a:t>9/8/2025</a:t>
             </a:fld>
             <a:endParaRPr lang="en-US"/>
           </a:p>
@@ -3086,7 +3087,7 @@
           <a:p>
             <a:fld id="{08EBD9BC-8B18-4DA6-8AA8-A6CD51BCB149}" type="datetimeFigureOut">
               <a:rPr lang="en-US" smtClean="0"/>
-              <a:t>12/12/2024</a:t>
+              <a:t>9/8/2025</a:t>
             </a:fld>
             <a:endParaRPr lang="en-US"/>
           </a:p>
@@ -3751,6 +3752,281 @@
         <p:cNvPr id="1" name="">
           <a:extLst>
             <a:ext uri="{FF2B5EF4-FFF2-40B4-BE49-F238E27FC236}">
+              <a16:creationId xmlns:a16="http://schemas.microsoft.com/office/drawing/2014/main" id="{3E241931-B40B-858D-9AEC-91FA68142802}"/>
+            </a:ext>
+          </a:extLst>
+        </p:cNvPr>
+        <p:cNvGrpSpPr/>
+        <p:nvPr/>
+      </p:nvGrpSpPr>
+      <p:grpSpPr>
+        <a:xfrm>
+          <a:off x="0" y="0"/>
+          <a:ext cx="0" cy="0"/>
+          <a:chOff x="0" y="0"/>
+          <a:chExt cx="0" cy="0"/>
+        </a:xfrm>
+      </p:grpSpPr>
+      <p:grpSp>
+        <p:nvGrpSpPr>
+          <p:cNvPr id="4" name="Groep 3">
+            <a:extLst>
+              <a:ext uri="{FF2B5EF4-FFF2-40B4-BE49-F238E27FC236}">
+                <a16:creationId xmlns:a16="http://schemas.microsoft.com/office/drawing/2014/main" id="{409C6256-50B0-797B-2306-029E1BB3DCAA}"/>
+              </a:ext>
+            </a:extLst>
+          </p:cNvPr>
+          <p:cNvGrpSpPr>
+            <a:grpSpLocks noChangeAspect="1"/>
+          </p:cNvGrpSpPr>
+          <p:nvPr/>
+        </p:nvGrpSpPr>
+        <p:grpSpPr>
+          <a:xfrm>
+            <a:off x="1" y="0"/>
+            <a:ext cx="5400675" cy="5400675"/>
+            <a:chOff x="3396000" y="350196"/>
+            <a:chExt cx="5400000" cy="5400000"/>
+          </a:xfrm>
+        </p:grpSpPr>
+        <p:sp>
+          <p:nvSpPr>
+            <p:cNvPr id="5" name="Rechthoek: afgeronde hoeken 4">
+              <a:extLst>
+                <a:ext uri="{FF2B5EF4-FFF2-40B4-BE49-F238E27FC236}">
+                  <a16:creationId xmlns:a16="http://schemas.microsoft.com/office/drawing/2014/main" id="{1682A687-1AAB-B871-BE09-B03B42688608}"/>
+                </a:ext>
+              </a:extLst>
+            </p:cNvPr>
+            <p:cNvSpPr/>
+            <p:nvPr/>
+          </p:nvSpPr>
+          <p:spPr>
+            <a:xfrm>
+              <a:off x="3396000" y="350196"/>
+              <a:ext cx="5400000" cy="5400000"/>
+            </a:xfrm>
+            <a:prstGeom prst="roundRect">
+              <a:avLst>
+                <a:gd name="adj" fmla="val 11593"/>
+              </a:avLst>
+            </a:prstGeom>
+            <a:solidFill>
+              <a:srgbClr val="DCE7F0"/>
+            </a:solidFill>
+            <a:ln>
+              <a:noFill/>
+            </a:ln>
+          </p:spPr>
+          <p:style>
+            <a:lnRef idx="2">
+              <a:schemeClr val="accent1">
+                <a:shade val="15000"/>
+              </a:schemeClr>
+            </a:lnRef>
+            <a:fillRef idx="1">
+              <a:schemeClr val="accent1"/>
+            </a:fillRef>
+            <a:effectRef idx="0">
+              <a:schemeClr val="accent1"/>
+            </a:effectRef>
+            <a:fontRef idx="minor">
+              <a:schemeClr val="lt1"/>
+            </a:fontRef>
+          </p:style>
+          <p:txBody>
+            <a:bodyPr rtlCol="0" anchor="ctr"/>
+            <a:lstStyle/>
+            <a:p>
+              <a:pPr algn="ctr"/>
+              <a:endParaRPr lang="en-US" sz="452" dirty="0"/>
+            </a:p>
+          </p:txBody>
+        </p:sp>
+        <p:sp>
+          <p:nvSpPr>
+            <p:cNvPr id="6" name="Ovaal 5">
+              <a:extLst>
+                <a:ext uri="{FF2B5EF4-FFF2-40B4-BE49-F238E27FC236}">
+                  <a16:creationId xmlns:a16="http://schemas.microsoft.com/office/drawing/2014/main" id="{A0BF8596-AB26-51FF-3ED1-CBB222C9B9D1}"/>
+                </a:ext>
+              </a:extLst>
+            </p:cNvPr>
+            <p:cNvSpPr/>
+            <p:nvPr/>
+          </p:nvSpPr>
+          <p:spPr>
+            <a:xfrm>
+              <a:off x="4656000" y="918696"/>
+              <a:ext cx="2880000" cy="2880000"/>
+            </a:xfrm>
+            <a:prstGeom prst="ellipse">
+              <a:avLst/>
+            </a:prstGeom>
+            <a:solidFill>
+              <a:schemeClr val="bg1"/>
+            </a:solidFill>
+            <a:ln w="174625">
+              <a:solidFill>
+                <a:srgbClr val="00407A"/>
+              </a:solidFill>
+            </a:ln>
+            <a:effectLst/>
+          </p:spPr>
+          <p:style>
+            <a:lnRef idx="2">
+              <a:schemeClr val="accent1">
+                <a:shade val="15000"/>
+              </a:schemeClr>
+            </a:lnRef>
+            <a:fillRef idx="1">
+              <a:schemeClr val="accent1"/>
+            </a:fillRef>
+            <a:effectRef idx="0">
+              <a:schemeClr val="accent1"/>
+            </a:effectRef>
+            <a:fontRef idx="minor">
+              <a:schemeClr val="lt1"/>
+            </a:fontRef>
+          </p:style>
+          <p:txBody>
+            <a:bodyPr rtlCol="0" anchor="ctr"/>
+            <a:lstStyle/>
+            <a:p>
+              <a:pPr algn="ctr"/>
+              <a:endParaRPr lang="en-US" sz="452">
+                <a:solidFill>
+                  <a:srgbClr val="00407A"/>
+                </a:solidFill>
+              </a:endParaRPr>
+            </a:p>
+          </p:txBody>
+        </p:sp>
+        <p:sp>
+          <p:nvSpPr>
+            <p:cNvPr id="7" name="Tekstvak 6">
+              <a:extLst>
+                <a:ext uri="{FF2B5EF4-FFF2-40B4-BE49-F238E27FC236}">
+                  <a16:creationId xmlns:a16="http://schemas.microsoft.com/office/drawing/2014/main" id="{1A3AB1E0-511A-1E73-1433-C24E1D715112}"/>
+                </a:ext>
+              </a:extLst>
+            </p:cNvPr>
+            <p:cNvSpPr txBox="1"/>
+            <p:nvPr/>
+          </p:nvSpPr>
+          <p:spPr>
+            <a:xfrm>
+              <a:off x="3494493" y="3966916"/>
+              <a:ext cx="5203017" cy="1323274"/>
+            </a:xfrm>
+            <a:prstGeom prst="rect">
+              <a:avLst/>
+            </a:prstGeom>
+            <a:noFill/>
+          </p:spPr>
+          <p:txBody>
+            <a:bodyPr wrap="none" rtlCol="0">
+              <a:spAutoFit/>
+            </a:bodyPr>
+            <a:lstStyle/>
+            <a:p>
+              <a:pPr algn="ctr"/>
+              <a:r>
+                <a:rPr lang="nl-BE" sz="6000" b="1" dirty="0" err="1">
+                  <a:solidFill>
+                    <a:srgbClr val="00407A"/>
+                  </a:solidFill>
+                  <a:latin typeface="Aharoni" panose="02010803020104030203" pitchFamily="2" charset="-79"/>
+                  <a:cs typeface="Aharoni" panose="02010803020104030203" pitchFamily="2" charset="-79"/>
+                </a:rPr>
+                <a:t>InTimeAD</a:t>
+              </a:r>
+              <a:endParaRPr lang="nl-BE" sz="5400" b="1" dirty="0">
+                <a:solidFill>
+                  <a:srgbClr val="00407A"/>
+                </a:solidFill>
+                <a:latin typeface="Aharoni" panose="02010803020104030203" pitchFamily="2" charset="-79"/>
+                <a:cs typeface="Aharoni" panose="02010803020104030203" pitchFamily="2" charset="-79"/>
+              </a:endParaRPr>
+            </a:p>
+            <a:p>
+              <a:pPr algn="ctr"/>
+              <a:r>
+                <a:rPr lang="en-US" sz="2000" b="1" dirty="0">
+                  <a:solidFill>
+                    <a:srgbClr val="00407A"/>
+                  </a:solidFill>
+                  <a:latin typeface="Aharoni" panose="02010803020104030203" pitchFamily="2" charset="-79"/>
+                  <a:cs typeface="Aharoni" panose="02010803020104030203" pitchFamily="2" charset="-79"/>
+                </a:rPr>
+                <a:t>Interactive Time series anomaly detection</a:t>
+              </a:r>
+              <a:endParaRPr lang="en-US" sz="1600" b="1" dirty="0">
+                <a:solidFill>
+                  <a:srgbClr val="00407A"/>
+                </a:solidFill>
+                <a:latin typeface="Aharoni" panose="02010803020104030203" pitchFamily="2" charset="-79"/>
+                <a:cs typeface="Aharoni" panose="02010803020104030203" pitchFamily="2" charset="-79"/>
+              </a:endParaRPr>
+            </a:p>
+          </p:txBody>
+        </p:sp>
+        <p:pic>
+          <p:nvPicPr>
+            <p:cNvPr id="8" name="Graphic 7">
+              <a:extLst>
+                <a:ext uri="{FF2B5EF4-FFF2-40B4-BE49-F238E27FC236}">
+                  <a16:creationId xmlns:a16="http://schemas.microsoft.com/office/drawing/2014/main" id="{589C6003-AF80-A10A-D742-77AD5CFC8FDE}"/>
+                </a:ext>
+              </a:extLst>
+            </p:cNvPr>
+            <p:cNvPicPr/>
+            <p:nvPr/>
+          </p:nvPicPr>
+          <p:blipFill>
+            <a:blip r:embed="rId2">
+              <a:extLst>
+                <a:ext uri="{96DAC541-7B7A-43D3-8B79-37D633B846F1}">
+                  <asvg:svgBlip xmlns:asvg="http://schemas.microsoft.com/office/drawing/2016/SVG/main" r:embed="rId3"/>
+                </a:ext>
+              </a:extLst>
+            </a:blip>
+            <a:stretch>
+              <a:fillRect/>
+            </a:stretch>
+          </p:blipFill>
+          <p:spPr>
+            <a:xfrm>
+              <a:off x="4566000" y="1083696"/>
+              <a:ext cx="3060000" cy="2550000"/>
+            </a:xfrm>
+            <a:prstGeom prst="rect">
+              <a:avLst/>
+            </a:prstGeom>
+          </p:spPr>
+        </p:pic>
+      </p:grpSp>
+    </p:spTree>
+    <p:extLst>
+      <p:ext uri="{BB962C8B-B14F-4D97-AF65-F5344CB8AC3E}">
+        <p14:creationId xmlns:p14="http://schemas.microsoft.com/office/powerpoint/2010/main" val="2375758125"/>
+      </p:ext>
+    </p:extLst>
+  </p:cSld>
+  <p:clrMapOvr>
+    <a:masterClrMapping/>
+  </p:clrMapOvr>
+</p:sld>
+</file>
+
+<file path=ppt/slides/slide3.xml><?xml version="1.0" encoding="utf-8"?>
+<p:sld xmlns:a="http://schemas.openxmlformats.org/drawingml/2006/main" xmlns:r="http://schemas.openxmlformats.org/officeDocument/2006/relationships" xmlns:p="http://schemas.openxmlformats.org/presentationml/2006/main">
+  <p:cSld>
+    <p:spTree>
+      <p:nvGrpSpPr>
+        <p:cNvPr id="1" name="">
+          <a:extLst>
+            <a:ext uri="{FF2B5EF4-FFF2-40B4-BE49-F238E27FC236}">
               <a16:creationId xmlns:a16="http://schemas.microsoft.com/office/drawing/2014/main" id="{73D10A7A-5BE2-EF20-83CC-8FF983D4011C}"/>
             </a:ext>
           </a:extLst>
@@ -3962,7 +4238,7 @@
 </p:sld>
 </file>
 
-<file path=ppt/slides/slide3.xml><?xml version="1.0" encoding="utf-8"?>
+<file path=ppt/slides/slide4.xml><?xml version="1.0" encoding="utf-8"?>
 <p:sld xmlns:a="http://schemas.openxmlformats.org/drawingml/2006/main" xmlns:r="http://schemas.openxmlformats.org/officeDocument/2006/relationships" xmlns:p="http://schemas.openxmlformats.org/presentationml/2006/main">
   <p:cSld>
     <p:spTree>
@@ -4193,7 +4469,7 @@
 </p:sld>
 </file>
 
-<file path=ppt/slides/slide4.xml><?xml version="1.0" encoding="utf-8"?>
+<file path=ppt/slides/slide5.xml><?xml version="1.0" encoding="utf-8"?>
 <p:sld xmlns:a="http://schemas.openxmlformats.org/drawingml/2006/main" xmlns:r="http://schemas.openxmlformats.org/officeDocument/2006/relationships" xmlns:p="http://schemas.openxmlformats.org/presentationml/2006/main">
   <p:cSld>
     <p:spTree>
@@ -4348,7 +4624,7 @@
 </p:sld>
 </file>
 
-<file path=ppt/slides/slide5.xml><?xml version="1.0" encoding="utf-8"?>
+<file path=ppt/slides/slide6.xml><?xml version="1.0" encoding="utf-8"?>
 <p:sld xmlns:a="http://schemas.openxmlformats.org/drawingml/2006/main" xmlns:r="http://schemas.openxmlformats.org/officeDocument/2006/relationships" xmlns:p="http://schemas.openxmlformats.org/presentationml/2006/main">
   <p:cSld>
     <p:bg>

</xml_diff>